<commit_message>
Script de création du DWH
Version initiale du script unique de création du DWH :
> Squelette & commentaires
> Templates
> Table de faits "Ventes" et dimension "Temps"
</commit_message>
<xml_diff>
--- a/Documentation/3 - Documentation technique/Modelisation_EntrepotDeDonnées.pptx
+++ b/Documentation/3 - Documentation technique/Modelisation_EntrepotDeDonnées.pptx
@@ -4853,11 +4853,7 @@
             </a:r>
             <a:r>
               <a:rPr lang="fr-FR" sz="1800" b="1" smtClean="0"/>
-              <a:t>Bordeaux </a:t>
-            </a:r>
-            <a:r>
-              <a:rPr lang="fr-FR" sz="1800" b="1" smtClean="0"/>
-              <a:t>1 </a:t>
+              <a:t>Bordeaux 1 </a:t>
             </a:r>
             <a:endParaRPr lang="fr-FR" sz="1800" b="1" dirty="0" smtClean="0"/>
           </a:p>

</xml_diff>